<commit_message>
Added exercies lesson 2 for x++ and c#
</commit_message>
<xml_diff>
--- a/Programmazione ad Oggetti.pptx
+++ b/Programmazione ad Oggetti.pptx
@@ -5,10 +5,10 @@
     <p:sldMasterId id="2147483651" r:id="rId4"/>
   </p:sldMasterIdLst>
   <p:notesMasterIdLst>
-    <p:notesMasterId r:id="rId28"/>
+    <p:notesMasterId r:id="rId29"/>
   </p:notesMasterIdLst>
   <p:handoutMasterIdLst>
-    <p:handoutMasterId r:id="rId29"/>
+    <p:handoutMasterId r:id="rId30"/>
   </p:handoutMasterIdLst>
   <p:sldIdLst>
     <p:sldId id="293" r:id="rId5"/>
@@ -33,7 +33,8 @@
     <p:sldId id="555" r:id="rId24"/>
     <p:sldId id="556" r:id="rId25"/>
     <p:sldId id="567" r:id="rId26"/>
-    <p:sldId id="568" r:id="rId27"/>
+    <p:sldId id="569" r:id="rId27"/>
+    <p:sldId id="568" r:id="rId28"/>
   </p:sldIdLst>
   <p:sldSz cx="11880850" cy="6840538"/>
   <p:notesSz cx="6797675" cy="9926638"/>
@@ -2795,7 +2796,6 @@
               <a:rPr lang="it-IT"/>
               <a:t>Laboratorio di Informatica – Lezione 4</a:t>
             </a:r>
-            <a:endParaRPr lang="it-IT"/>
           </a:p>
         </p:txBody>
       </p:sp>
@@ -4049,7 +4049,7 @@
       </p:sp>
       <p:pic>
         <p:nvPicPr>
-          <p:cNvPr id="3" name=""/>
+          <p:cNvPr id="3" name="Picture 2"/>
           <p:cNvPicPr>
             <a:picLocks noChangeAspect="1"/>
           </p:cNvPicPr>
@@ -4640,7 +4640,7 @@
       </p:sp>
       <p:pic>
         <p:nvPicPr>
-          <p:cNvPr id="3" name=""/>
+          <p:cNvPr id="3" name="Picture 2"/>
           <p:cNvPicPr>
             <a:picLocks noChangeAspect="1"/>
           </p:cNvPicPr>
@@ -5224,7 +5224,7 @@
       </p:sp>
       <p:pic>
         <p:nvPicPr>
-          <p:cNvPr id="3" name=""/>
+          <p:cNvPr id="3" name="Picture 2"/>
           <p:cNvPicPr>
             <a:picLocks noChangeAspect="1"/>
           </p:cNvPicPr>
@@ -5256,7 +5256,7 @@
       </p:pic>
       <p:pic>
         <p:nvPicPr>
-          <p:cNvPr id="4" name=""/>
+          <p:cNvPr id="4" name="Picture 3"/>
           <p:cNvPicPr>
             <a:picLocks noChangeAspect="1"/>
           </p:cNvPicPr>
@@ -5722,7 +5722,7 @@
       </p:sp>
       <p:pic>
         <p:nvPicPr>
-          <p:cNvPr id="3" name=""/>
+          <p:cNvPr id="3" name="Picture 2"/>
           <p:cNvPicPr>
             <a:picLocks noChangeAspect="1"/>
           </p:cNvPicPr>
@@ -6254,7 +6254,7 @@
       </p:sp>
       <p:pic>
         <p:nvPicPr>
-          <p:cNvPr id="3" name=""/>
+          <p:cNvPr id="3" name="Picture 2"/>
           <p:cNvPicPr>
             <a:picLocks noChangeAspect="1"/>
           </p:cNvPicPr>
@@ -7107,7 +7107,7 @@
       </p:sp>
       <p:pic>
         <p:nvPicPr>
-          <p:cNvPr id="3" name=""/>
+          <p:cNvPr id="3" name="Picture 2"/>
           <p:cNvPicPr>
             <a:picLocks noChangeAspect="1"/>
           </p:cNvPicPr>
@@ -7715,7 +7715,7 @@
       </p:sp>
       <p:pic>
         <p:nvPicPr>
-          <p:cNvPr id="3" name=""/>
+          <p:cNvPr id="3" name="Picture 2"/>
           <p:cNvPicPr>
             <a:picLocks noChangeAspect="1"/>
           </p:cNvPicPr>
@@ -8289,7 +8289,7 @@
       </p:sp>
       <p:pic>
         <p:nvPicPr>
-          <p:cNvPr id="3" name=""/>
+          <p:cNvPr id="3" name="Picture 2"/>
           <p:cNvPicPr>
             <a:picLocks noChangeAspect="1"/>
           </p:cNvPicPr>
@@ -8998,7 +8998,7 @@
       </p:sp>
       <p:pic>
         <p:nvPicPr>
-          <p:cNvPr id="3" name=""/>
+          <p:cNvPr id="3" name="Picture 2"/>
           <p:cNvPicPr>
             <a:picLocks noChangeAspect="1"/>
           </p:cNvPicPr>
@@ -9774,7 +9774,7 @@
       </p:sp>
       <p:pic>
         <p:nvPicPr>
-          <p:cNvPr id="2" name=""/>
+          <p:cNvPr id="2" name="Picture 1"/>
           <p:cNvPicPr>
             <a:picLocks noChangeAspect="1"/>
           </p:cNvPicPr>
@@ -10358,7 +10358,7 @@
       </p:sp>
       <p:pic>
         <p:nvPicPr>
-          <p:cNvPr id="3" name=""/>
+          <p:cNvPr id="3" name="Picture 2"/>
           <p:cNvPicPr>
             <a:picLocks noChangeAspect="1"/>
           </p:cNvPicPr>
@@ -10863,6 +10863,131 @@
       </p:grpSpPr>
       <p:sp>
         <p:nvSpPr>
+          <p:cNvPr id="2" name="Content Placeholder 1"/>
+          <p:cNvSpPr>
+            <a:spLocks noGrp="1"/>
+          </p:cNvSpPr>
+          <p:nvPr>
+            <p:ph idx="1"/>
+          </p:nvPr>
+        </p:nvSpPr>
+        <p:spPr/>
+        <p:txBody>
+          <a:bodyPr/>
+          <a:lstStyle/>
+          <a:p>
+            <a:r>
+              <a:rPr lang="it-IT" sz="1800" dirty="0"/>
+              <a:t>Con l'espressione numero complesso si intende un numero formato da una </a:t>
+            </a:r>
+            <a:r>
+              <a:rPr lang="it-IT" sz="1800" b="1" dirty="0">
+                <a:solidFill>
+                  <a:srgbClr val="C00000"/>
+                </a:solidFill>
+              </a:rPr>
+              <a:t>parte immaginaria </a:t>
+            </a:r>
+            <a:r>
+              <a:rPr lang="it-IT" sz="1800" dirty="0"/>
+              <a:t>e da una </a:t>
+            </a:r>
+            <a:r>
+              <a:rPr lang="it-IT" sz="1800" b="1" dirty="0">
+                <a:solidFill>
+                  <a:srgbClr val="C00000"/>
+                </a:solidFill>
+              </a:rPr>
+              <a:t>parte reale</a:t>
+            </a:r>
+            <a:r>
+              <a:rPr lang="it-IT" sz="1800" dirty="0"/>
+              <a:t>. Può essere perciò rappresentato dalla somma di un numero reale e di un numero immaginario (cioè un multiplo dell'unità immaginaria, indicata con la lettera i).</a:t>
+            </a:r>
+          </a:p>
+          <a:p>
+            <a:endParaRPr lang="it-IT" sz="1800" dirty="0"/>
+          </a:p>
+          <a:p>
+            <a:r>
+              <a:rPr lang="it-IT" sz="1800" dirty="0"/>
+              <a:t>Un numero reale è un numero complesso con parte immaginaria = 0.</a:t>
+            </a:r>
+          </a:p>
+          <a:p>
+            <a:r>
+              <a:rPr lang="it-IT" sz="1800" dirty="0"/>
+              <a:t>Le operazioni algebriche si fanno in questo modo:</a:t>
+            </a:r>
+          </a:p>
+          <a:p>
+            <a:pPr lvl="1"/>
+            <a:r>
+              <a:rPr lang="it-IT" sz="1400" b="1" dirty="0"/>
+              <a:t>somma</a:t>
+            </a:r>
+            <a:r>
+              <a:rPr lang="it-IT" sz="1400" dirty="0"/>
+              <a:t>: si sommano parte reale con parte reale e parte immaginaria con parte immaginaria</a:t>
+            </a:r>
+          </a:p>
+          <a:p>
+            <a:pPr lvl="1"/>
+            <a:r>
+              <a:rPr lang="it-IT" sz="1400" b="1" dirty="0"/>
+              <a:t>sottrazione</a:t>
+            </a:r>
+            <a:r>
+              <a:rPr lang="it-IT" sz="1400" dirty="0"/>
+              <a:t>: si sottraggono parte reale con parte reale e parte immaginaria con parte immaginaria</a:t>
+            </a:r>
+          </a:p>
+          <a:p>
+            <a:pPr lvl="1"/>
+            <a:r>
+              <a:rPr lang="it-IT" sz="1400" b="1" dirty="0"/>
+              <a:t>prodotto</a:t>
+            </a:r>
+            <a:r>
+              <a:rPr lang="it-IT" sz="1400" dirty="0"/>
+              <a:t>:</a:t>
+            </a:r>
+            <a:br>
+              <a:rPr lang="it-IT" sz="1400" dirty="0"/>
+            </a:br>
+            <a:endParaRPr lang="it-IT" sz="1400" dirty="0"/>
+          </a:p>
+          <a:p>
+            <a:pPr lvl="1"/>
+            <a:r>
+              <a:rPr lang="it-IT" sz="1400" b="1" dirty="0"/>
+              <a:t>rapporto</a:t>
+            </a:r>
+            <a:r>
+              <a:rPr lang="it-IT" sz="1400" dirty="0"/>
+              <a:t>: </a:t>
+            </a:r>
+          </a:p>
+          <a:p>
+            <a:endParaRPr lang="it-IT" sz="1800" dirty="0"/>
+          </a:p>
+          <a:p>
+            <a:r>
+              <a:rPr lang="it-IT" sz="1800" dirty="0"/>
+              <a:t>Per passare alla rappresentazione come punto di un piano si usano le formule:</a:t>
+            </a:r>
+            <a:endParaRPr lang="it-IT" sz="1800" dirty="0"/>
+          </a:p>
+          <a:p>
+            <a:pPr marL="79044" indent="0">
+              <a:buNone/>
+            </a:pPr>
+            <a:endParaRPr lang="it-IT" sz="1800" dirty="0"/>
+          </a:p>
+        </p:txBody>
+      </p:sp>
+      <p:sp>
+        <p:nvSpPr>
           <p:cNvPr id="9" name="Title 2"/>
           <p:cNvSpPr>
             <a:spLocks noGrp="1"/>
@@ -10878,7 +11003,7 @@
           <a:p>
             <a:r>
               <a:rPr lang="it-IT" dirty="0"/>
-              <a:t>Soluzioni?</a:t>
+              <a:t>I numeri complessi</a:t>
             </a:r>
             <a:endParaRPr lang="it-IT" sz="2800" dirty="0">
               <a:effectLst/>
@@ -10910,6 +11035,172 @@
               <a:rPr lang="it-IT" smtClean="0"/>
               <a:pPr/>
               <a:t>23</a:t>
+            </a:fld>
+            <a:endParaRPr lang="it-IT"/>
+          </a:p>
+        </p:txBody>
+      </p:sp>
+      <p:pic>
+        <p:nvPicPr>
+          <p:cNvPr id="5" name="Picture 4"/>
+          <p:cNvPicPr>
+            <a:picLocks noChangeAspect="1"/>
+          </p:cNvPicPr>
+          <p:nvPr/>
+        </p:nvPicPr>
+        <p:blipFill>
+          <a:blip r:embed="rId2"/>
+          <a:stretch>
+            <a:fillRect/>
+          </a:stretch>
+        </p:blipFill>
+        <p:spPr>
+          <a:xfrm>
+            <a:off x="4240833" y="5003281"/>
+            <a:ext cx="2486025" cy="1352550"/>
+          </a:xfrm>
+          <a:prstGeom prst="rect">
+            <a:avLst/>
+          </a:prstGeom>
+        </p:spPr>
+      </p:pic>
+      <p:pic>
+        <p:nvPicPr>
+          <p:cNvPr id="7" name="Picture 6"/>
+          <p:cNvPicPr>
+            <a:picLocks noChangeAspect="1"/>
+          </p:cNvPicPr>
+          <p:nvPr/>
+        </p:nvPicPr>
+        <p:blipFill rotWithShape="1">
+          <a:blip r:embed="rId3">
+            <a:clrChange>
+              <a:clrFrom>
+                <a:srgbClr val="FFFFFF"/>
+              </a:clrFrom>
+              <a:clrTo>
+                <a:srgbClr val="FFFFFF">
+                  <a:alpha val="0"/>
+                </a:srgbClr>
+              </a:clrTo>
+            </a:clrChange>
+          </a:blip>
+          <a:srcRect t="30062"/>
+          <a:stretch/>
+        </p:blipFill>
+        <p:spPr>
+          <a:xfrm>
+            <a:off x="2203756" y="3943381"/>
+            <a:ext cx="5734050" cy="599540"/>
+          </a:xfrm>
+          <a:prstGeom prst="rect">
+            <a:avLst/>
+          </a:prstGeom>
+        </p:spPr>
+      </p:pic>
+      <p:pic>
+        <p:nvPicPr>
+          <p:cNvPr id="8" name="Picture 7"/>
+          <p:cNvPicPr>
+            <a:picLocks noChangeAspect="1"/>
+          </p:cNvPicPr>
+          <p:nvPr/>
+        </p:nvPicPr>
+        <p:blipFill>
+          <a:blip r:embed="rId4"/>
+          <a:stretch>
+            <a:fillRect/>
+          </a:stretch>
+        </p:blipFill>
+        <p:spPr>
+          <a:xfrm>
+            <a:off x="2452142" y="3565597"/>
+            <a:ext cx="3657600" cy="333375"/>
+          </a:xfrm>
+          <a:prstGeom prst="rect">
+            <a:avLst/>
+          </a:prstGeom>
+        </p:spPr>
+      </p:pic>
+    </p:spTree>
+    <p:extLst>
+      <p:ext uri="{BB962C8B-B14F-4D97-AF65-F5344CB8AC3E}">
+        <p14:creationId xmlns:p14="http://schemas.microsoft.com/office/powerpoint/2010/main" val="2705860599"/>
+      </p:ext>
+    </p:extLst>
+  </p:cSld>
+  <p:clrMapOvr>
+    <a:masterClrMapping/>
+  </p:clrMapOvr>
+</p:sld>
+</file>
+
+<file path=ppt/slides/slide24.xml><?xml version="1.0" encoding="utf-8"?>
+<p:sld xmlns:a="http://schemas.openxmlformats.org/drawingml/2006/main" xmlns:r="http://schemas.openxmlformats.org/officeDocument/2006/relationships" xmlns:p="http://schemas.openxmlformats.org/presentationml/2006/main">
+  <p:cSld>
+    <p:spTree>
+      <p:nvGrpSpPr>
+        <p:cNvPr id="1" name=""/>
+        <p:cNvGrpSpPr/>
+        <p:nvPr/>
+      </p:nvGrpSpPr>
+      <p:grpSpPr>
+        <a:xfrm>
+          <a:off x="0" y="0"/>
+          <a:ext cx="0" cy="0"/>
+          <a:chOff x="0" y="0"/>
+          <a:chExt cx="0" cy="0"/>
+        </a:xfrm>
+      </p:grpSpPr>
+      <p:sp>
+        <p:nvSpPr>
+          <p:cNvPr id="9" name="Title 2"/>
+          <p:cNvSpPr>
+            <a:spLocks noGrp="1"/>
+          </p:cNvSpPr>
+          <p:nvPr>
+            <p:ph type="title"/>
+          </p:nvPr>
+        </p:nvSpPr>
+        <p:spPr/>
+        <p:txBody>
+          <a:bodyPr/>
+          <a:lstStyle/>
+          <a:p>
+            <a:r>
+              <a:rPr lang="it-IT" dirty="0"/>
+              <a:t>Soluzioni?</a:t>
+            </a:r>
+            <a:endParaRPr lang="it-IT" sz="2800" dirty="0">
+              <a:effectLst/>
+            </a:endParaRPr>
+          </a:p>
+        </p:txBody>
+      </p:sp>
+      <p:sp>
+        <p:nvSpPr>
+          <p:cNvPr id="6" name="Slide Number Placeholder 4"/>
+          <p:cNvSpPr>
+            <a:spLocks noGrp="1"/>
+          </p:cNvSpPr>
+          <p:nvPr>
+            <p:ph type="sldNum" sz="quarter" idx="12"/>
+          </p:nvPr>
+        </p:nvSpPr>
+        <p:spPr>
+          <a:xfrm>
+            <a:off x="9027918" y="6590846"/>
+            <a:ext cx="855983" cy="143633"/>
+          </a:xfrm>
+        </p:spPr>
+        <p:txBody>
+          <a:bodyPr/>
+          <a:lstStyle/>
+          <a:p>
+            <a:fld id="{FB20157B-BF21-4976-810E-1ABA2FD4E36F}" type="slidenum">
+              <a:rPr lang="it-IT" smtClean="0"/>
+              <a:pPr/>
+              <a:t>24</a:t>
             </a:fld>
             <a:endParaRPr lang="it-IT"/>
           </a:p>
@@ -11083,7 +11374,7 @@
       </p:sp>
       <p:pic>
         <p:nvPicPr>
-          <p:cNvPr id="2" name=""/>
+          <p:cNvPr id="2" name="Picture 1"/>
           <p:cNvPicPr>
             <a:picLocks noChangeAspect="1"/>
           </p:cNvPicPr>
@@ -11165,7 +11456,7 @@
       </p:sp>
       <p:pic>
         <p:nvPicPr>
-          <p:cNvPr id="5" name=""/>
+          <p:cNvPr id="5" name="Picture 4"/>
           <p:cNvPicPr>
             <a:picLocks noChangeAspect="1"/>
           </p:cNvPicPr>
@@ -13010,7 +13301,7 @@
       </p:sp>
       <p:pic>
         <p:nvPicPr>
-          <p:cNvPr id="4" name=""/>
+          <p:cNvPr id="4" name="Picture 3"/>
           <p:cNvPicPr>
             <a:picLocks noChangeAspect="1"/>
           </p:cNvPicPr>
@@ -13045,7 +13336,7 @@
       </p:pic>
       <p:pic>
         <p:nvPicPr>
-          <p:cNvPr id="5" name=""/>
+          <p:cNvPr id="5" name="Picture 4"/>
           <p:cNvPicPr>
             <a:picLocks noChangeAspect="1"/>
           </p:cNvPicPr>
@@ -13080,7 +13371,7 @@
       </p:pic>
       <p:pic>
         <p:nvPicPr>
-          <p:cNvPr id="6" name=""/>
+          <p:cNvPr id="6" name="Picture 5"/>
           <p:cNvPicPr>
             <a:picLocks noChangeAspect="1"/>
           </p:cNvPicPr>
@@ -13115,7 +13406,7 @@
       </p:pic>
       <p:pic>
         <p:nvPicPr>
-          <p:cNvPr id="7" name=""/>
+          <p:cNvPr id="7" name="Picture 6"/>
           <p:cNvPicPr>
             <a:picLocks noChangeAspect="1"/>
           </p:cNvPicPr>
@@ -13150,7 +13441,7 @@
       </p:pic>
       <p:pic>
         <p:nvPicPr>
-          <p:cNvPr id="8" name=""/>
+          <p:cNvPr id="8" name="Picture 7"/>
           <p:cNvPicPr>
             <a:picLocks noChangeAspect="1"/>
           </p:cNvPicPr>
@@ -18892,6 +19183,12 @@
 </file>
 
 <file path=customXml/item2.xml><?xml version="1.0" encoding="utf-8"?>
+<p:properties xmlns:p="http://schemas.microsoft.com/office/2006/metadata/properties" xmlns:xsi="http://www.w3.org/2001/XMLSchema-instance" xmlns:pc="http://schemas.microsoft.com/office/infopath/2007/PartnerControls">
+  <documentManagement/>
+</p:properties>
+</file>
+
+<file path=customXml/item3.xml><?xml version="1.0" encoding="utf-8"?>
 <ct:contentTypeSchema xmlns:ct="http://schemas.microsoft.com/office/2006/metadata/contentType" xmlns:ma="http://schemas.microsoft.com/office/2006/metadata/properties/metaAttributes" ct:_="" ma:_="" ma:contentTypeName="Document" ma:contentTypeID="0x010100D3F842D2DECB264FA3B88BEF4917C2E0" ma:contentTypeVersion="0" ma:contentTypeDescription="Create a new document." ma:contentTypeScope="" ma:versionID="5caae4c1d66e398fa96cbdbff08805c9">
   <xsd:schema xmlns:xsd="http://www.w3.org/2001/XMLSchema" xmlns:xs="http://www.w3.org/2001/XMLSchema" xmlns:p="http://schemas.microsoft.com/office/2006/metadata/properties" targetNamespace="http://schemas.microsoft.com/office/2006/metadata/properties" ma:root="true" ma:fieldsID="c64490b4aec6201516c3a874156f37b2">
     <xsd:element name="properties">
@@ -19005,12 +19302,6 @@
 </ct:contentTypeSchema>
 </file>
 
-<file path=customXml/item3.xml><?xml version="1.0" encoding="utf-8"?>
-<p:properties xmlns:p="http://schemas.microsoft.com/office/2006/metadata/properties" xmlns:xsi="http://www.w3.org/2001/XMLSchema-instance" xmlns:pc="http://schemas.microsoft.com/office/infopath/2007/PartnerControls">
-  <documentManagement/>
-</p:properties>
-</file>
-
 <file path=customXml/itemProps1.xml><?xml version="1.0" encoding="utf-8"?>
 <ds:datastoreItem xmlns:ds="http://schemas.openxmlformats.org/officeDocument/2006/customXml" ds:itemID="{6284E3BA-FE6E-4F67-9072-1F25BCD921CF}">
   <ds:schemaRefs>
@@ -19020,6 +19311,21 @@
 </file>
 
 <file path=customXml/itemProps2.xml><?xml version="1.0" encoding="utf-8"?>
+<ds:datastoreItem xmlns:ds="http://schemas.openxmlformats.org/officeDocument/2006/customXml" ds:itemID="{EEAC1E32-0142-4827-B761-C86BDAF25AFB}">
+  <ds:schemaRefs>
+    <ds:schemaRef ds:uri="http://schemas.microsoft.com/office/2006/documentManagement/types"/>
+    <ds:schemaRef ds:uri="http://www.w3.org/XML/1998/namespace"/>
+    <ds:schemaRef ds:uri="http://purl.org/dc/terms/"/>
+    <ds:schemaRef ds:uri="http://purl.org/dc/elements/1.1/"/>
+    <ds:schemaRef ds:uri="http://purl.org/dc/dcmitype/"/>
+    <ds:schemaRef ds:uri="http://schemas.microsoft.com/office/infopath/2007/PartnerControls"/>
+    <ds:schemaRef ds:uri="http://schemas.openxmlformats.org/package/2006/metadata/core-properties"/>
+    <ds:schemaRef ds:uri="http://schemas.microsoft.com/office/2006/metadata/properties"/>
+  </ds:schemaRefs>
+</ds:datastoreItem>
+</file>
+
+<file path=customXml/itemProps3.xml><?xml version="1.0" encoding="utf-8"?>
 <ds:datastoreItem xmlns:ds="http://schemas.openxmlformats.org/officeDocument/2006/customXml" ds:itemID="{5F279C50-D5EA-46DF-ADB8-A5D06C18EB85}">
   <ds:schemaRefs>
     <ds:schemaRef ds:uri="http://schemas.microsoft.com/office/2006/metadata/contentType"/>
@@ -19033,19 +19339,4 @@
     <ds:schemaRef ds:uri="http://schemas.microsoft.com/office/infopath/2007/PartnerControls"/>
   </ds:schemaRefs>
 </ds:datastoreItem>
-</file>
-
-<file path=customXml/itemProps3.xml><?xml version="1.0" encoding="utf-8"?>
-<ds:datastoreItem xmlns:ds="http://schemas.openxmlformats.org/officeDocument/2006/customXml" ds:itemID="{EEAC1E32-0142-4827-B761-C86BDAF25AFB}">
-  <ds:schemaRefs>
-    <ds:schemaRef ds:uri="http://schemas.microsoft.com/office/2006/documentManagement/types"/>
-    <ds:schemaRef ds:uri="http://www.w3.org/XML/1998/namespace"/>
-    <ds:schemaRef ds:uri="http://purl.org/dc/terms/"/>
-    <ds:schemaRef ds:uri="http://purl.org/dc/elements/1.1/"/>
-    <ds:schemaRef ds:uri="http://purl.org/dc/dcmitype/"/>
-    <ds:schemaRef ds:uri="http://schemas.microsoft.com/office/infopath/2007/PartnerControls"/>
-    <ds:schemaRef ds:uri="http://schemas.openxmlformats.org/package/2006/metadata/core-properties"/>
-    <ds:schemaRef ds:uri="http://schemas.microsoft.com/office/2006/metadata/properties"/>
-  </ds:schemaRefs>
-</ds:datastoreItem>
 </file>
</xml_diff>